<commit_message>
Add comparison of extensions to Members
</commit_message>
<xml_diff>
--- a/CSharp3.pptx
+++ b/CSharp3.pptx
@@ -5,7 +5,7 @@
     <p:sldMasterId id="2147483684" r:id="rId1"/>
   </p:sldMasterIdLst>
   <p:notesMasterIdLst>
-    <p:notesMasterId r:id="rId11"/>
+    <p:notesMasterId r:id="rId12"/>
   </p:notesMasterIdLst>
   <p:sldIdLst>
     <p:sldId id="256" r:id="rId2"/>
@@ -17,6 +17,7 @@
     <p:sldId id="260" r:id="rId8"/>
     <p:sldId id="264" r:id="rId9"/>
     <p:sldId id="265" r:id="rId10"/>
+    <p:sldId id="266" r:id="rId11"/>
   </p:sldIdLst>
   <p:sldSz cx="9144000" cy="6858000" type="screen4x3"/>
   <p:notesSz cx="6858000" cy="9144000"/>
@@ -3718,6 +3719,1883 @@
         <p:cTn id="1" dur="indefinite" restart="never" nodeType="tmRoot"/>
       </p:par>
     </p:tnLst>
+  </p:timing>
+</p:sld>
+</file>
+
+<file path=ppt/slides/slide10.xml><?xml version="1.0" encoding="utf-8"?>
+<p:sld xmlns:a="http://schemas.openxmlformats.org/drawingml/2006/main" xmlns:r="http://schemas.openxmlformats.org/officeDocument/2006/relationships" xmlns:p="http://schemas.openxmlformats.org/presentationml/2006/main">
+  <p:cSld>
+    <p:spTree>
+      <p:nvGrpSpPr>
+        <p:cNvPr id="1" name=""/>
+        <p:cNvGrpSpPr/>
+        <p:nvPr/>
+      </p:nvGrpSpPr>
+      <p:grpSpPr>
+        <a:xfrm>
+          <a:off x="0" y="0"/>
+          <a:ext cx="0" cy="0"/>
+          <a:chOff x="0" y="0"/>
+          <a:chExt cx="0" cy="0"/>
+        </a:xfrm>
+      </p:grpSpPr>
+      <p:sp>
+        <p:nvSpPr>
+          <p:cNvPr id="2" name="Title 1"/>
+          <p:cNvSpPr>
+            <a:spLocks noGrp="1"/>
+          </p:cNvSpPr>
+          <p:nvPr>
+            <p:ph type="title"/>
+          </p:nvPr>
+        </p:nvSpPr>
+        <p:spPr/>
+        <p:txBody>
+          <a:bodyPr>
+            <a:normAutofit/>
+          </a:bodyPr>
+          <a:lstStyle/>
+          <a:p>
+            <a:r>
+              <a:rPr lang="sv-SE" dirty="0" smtClean="0"/>
+              <a:t>SOLID extension vs members</a:t>
+            </a:r>
+            <a:br>
+              <a:rPr lang="sv-SE" dirty="0" smtClean="0"/>
+            </a:br>
+            <a:r>
+              <a:rPr lang="sv-SE" sz="1600" dirty="0" smtClean="0"/>
+              <a:t>(Examined in the context of an interface method that could be implemented as an extension)</a:t>
+            </a:r>
+            <a:endParaRPr lang="sv-SE" sz="1600" dirty="0"/>
+          </a:p>
+        </p:txBody>
+      </p:sp>
+      <p:sp>
+        <p:nvSpPr>
+          <p:cNvPr id="3" name="Content Placeholder 2"/>
+          <p:cNvSpPr>
+            <a:spLocks noGrp="1"/>
+          </p:cNvSpPr>
+          <p:nvPr>
+            <p:ph idx="1"/>
+          </p:nvPr>
+        </p:nvSpPr>
+        <p:spPr>
+          <a:xfrm>
+            <a:off x="457200" y="1600200"/>
+            <a:ext cx="8229600" cy="4972072"/>
+          </a:xfrm>
+        </p:spPr>
+        <p:txBody>
+          <a:bodyPr>
+            <a:normAutofit fontScale="92500" lnSpcReduction="20000"/>
+          </a:bodyPr>
+          <a:lstStyle/>
+          <a:p>
+            <a:r>
+              <a:rPr lang="sv-SE" sz="2000" dirty="0" smtClean="0"/>
+              <a:t>SRP</a:t>
+            </a:r>
+          </a:p>
+          <a:p>
+            <a:pPr lvl="1"/>
+            <a:r>
+              <a:rPr lang="sv-SE" sz="1800" dirty="0" smtClean="0"/>
+              <a:t>Extensions lets interfaces and implementors stay minimal and cohesive</a:t>
+            </a:r>
+          </a:p>
+          <a:p>
+            <a:pPr lvl="2"/>
+            <a:r>
+              <a:rPr lang="sv-SE" sz="1400" dirty="0" smtClean="0"/>
+              <a:t>Formatting, Conversions, Projections etc is not something that IEnumerable&lt;T&gt; </a:t>
+            </a:r>
+            <a:r>
+              <a:rPr lang="sv-SE" sz="1400" b="1" dirty="0" smtClean="0"/>
+              <a:t>does</a:t>
+            </a:r>
+            <a:r>
+              <a:rPr lang="sv-SE" sz="1400" dirty="0" smtClean="0"/>
+              <a:t>.</a:t>
+            </a:r>
+            <a:br>
+              <a:rPr lang="sv-SE" sz="1400" dirty="0" smtClean="0"/>
+            </a:br>
+            <a:r>
+              <a:rPr lang="sv-SE" sz="1400" dirty="0" smtClean="0"/>
+              <a:t>It’s something you </a:t>
+            </a:r>
+            <a:r>
+              <a:rPr lang="sv-SE" sz="1400" b="1" dirty="0" smtClean="0"/>
+              <a:t>do with</a:t>
+            </a:r>
+            <a:r>
+              <a:rPr lang="sv-SE" sz="1400" dirty="0" smtClean="0"/>
+              <a:t> an IEnumerable&lt;T&gt;.</a:t>
+            </a:r>
+          </a:p>
+          <a:p>
+            <a:r>
+              <a:rPr lang="sv-SE" sz="2000" dirty="0" smtClean="0"/>
+              <a:t>OCP</a:t>
+            </a:r>
+          </a:p>
+          <a:p>
+            <a:pPr lvl="1"/>
+            <a:r>
+              <a:rPr lang="sv-SE" sz="1800" dirty="0" smtClean="0"/>
+              <a:t>Extensions add functionality without modifying interfaces or implementors</a:t>
+            </a:r>
+          </a:p>
+          <a:p>
+            <a:pPr lvl="2"/>
+            <a:r>
+              <a:rPr lang="sv-SE" sz="1400" dirty="0" smtClean="0"/>
+              <a:t>You can add an Linq operator that will work with all others without changing IEnumerable&lt;T&gt;</a:t>
+            </a:r>
+          </a:p>
+          <a:p>
+            <a:r>
+              <a:rPr lang="sv-SE" sz="2200" dirty="0" smtClean="0"/>
+              <a:t>LSP</a:t>
+            </a:r>
+          </a:p>
+          <a:p>
+            <a:pPr lvl="1"/>
+            <a:r>
+              <a:rPr lang="sv-SE" sz="1800" dirty="0" smtClean="0"/>
+              <a:t>Minimal interfaces make implementation simpler and less likely to violate LSP</a:t>
+            </a:r>
+          </a:p>
+          <a:p>
+            <a:pPr lvl="2"/>
+            <a:r>
+              <a:rPr lang="sv-SE" sz="1400" dirty="0" smtClean="0"/>
+              <a:t>Implementing IEnumerable&lt;T&gt; is trivial but the power you get for free is huge.</a:t>
+            </a:r>
+          </a:p>
+          <a:p>
+            <a:r>
+              <a:rPr lang="sv-SE" sz="2200" dirty="0" smtClean="0"/>
+              <a:t>ISP</a:t>
+            </a:r>
+          </a:p>
+          <a:p>
+            <a:pPr lvl="1"/>
+            <a:r>
+              <a:rPr lang="sv-SE" sz="1800" dirty="0" smtClean="0"/>
+              <a:t>A method operating on a type is a client. </a:t>
+            </a:r>
+          </a:p>
+          <a:p>
+            <a:pPr lvl="2"/>
+            <a:r>
+              <a:rPr lang="sv-SE" sz="1400" dirty="0" smtClean="0"/>
+              <a:t>A member is forced to depend on the fattest existing interface to a class. The private view.</a:t>
+            </a:r>
+          </a:p>
+          <a:p>
+            <a:pPr lvl="1"/>
+            <a:r>
+              <a:rPr lang="sv-SE" sz="1800" dirty="0" smtClean="0"/>
+              <a:t>Implementors are clients</a:t>
+            </a:r>
+          </a:p>
+          <a:p>
+            <a:pPr lvl="2"/>
+            <a:r>
+              <a:rPr lang="sv-SE" sz="1400" dirty="0" smtClean="0"/>
+              <a:t>Implementors cannot possibly need to reimplement something that can be an extension</a:t>
+            </a:r>
+          </a:p>
+          <a:p>
+            <a:r>
+              <a:rPr lang="sv-SE" sz="2400" dirty="0" smtClean="0"/>
+              <a:t>DRY</a:t>
+            </a:r>
+          </a:p>
+          <a:p>
+            <a:pPr lvl="1"/>
+            <a:r>
+              <a:rPr lang="sv-SE" sz="2000" dirty="0" smtClean="0"/>
+              <a:t>Members forces multiple implementors to rewrite identical logic</a:t>
+            </a:r>
+          </a:p>
+          <a:p>
+            <a:pPr lvl="2"/>
+            <a:r>
+              <a:rPr lang="sv-SE" sz="1400" dirty="0" smtClean="0"/>
+              <a:t>Extensions enable multiple inheritance of functionality</a:t>
+            </a:r>
+          </a:p>
+          <a:p>
+            <a:pPr lvl="2"/>
+            <a:r>
+              <a:rPr lang="sv-SE" sz="1400" dirty="0" smtClean="0"/>
+              <a:t>Duplicate methods avoided with extensions  =  (methods * implementors) - methods</a:t>
+            </a:r>
+          </a:p>
+        </p:txBody>
+      </p:sp>
+    </p:spTree>
+  </p:cSld>
+  <p:clrMapOvr>
+    <a:masterClrMapping/>
+  </p:clrMapOvr>
+  <p:timing>
+    <p:tnLst>
+      <p:par>
+        <p:cTn id="1" dur="indefinite" restart="never" nodeType="tmRoot">
+          <p:childTnLst>
+            <p:seq concurrent="1" nextAc="seek">
+              <p:cTn id="2" dur="indefinite" nodeType="mainSeq">
+                <p:childTnLst>
+                  <p:par>
+                    <p:cTn id="3" fill="hold">
+                      <p:stCondLst>
+                        <p:cond delay="indefinite"/>
+                      </p:stCondLst>
+                      <p:childTnLst>
+                        <p:par>
+                          <p:cTn id="4" fill="hold">
+                            <p:stCondLst>
+                              <p:cond delay="0"/>
+                            </p:stCondLst>
+                            <p:childTnLst>
+                              <p:par>
+                                <p:cTn id="5" presetID="2" presetClass="entr" presetSubtype="4" fill="hold" grpId="0" nodeType="clickEffect">
+                                  <p:stCondLst>
+                                    <p:cond delay="0"/>
+                                  </p:stCondLst>
+                                  <p:childTnLst>
+                                    <p:set>
+                                      <p:cBhvr>
+                                        <p:cTn id="6" dur="1" fill="hold">
+                                          <p:stCondLst>
+                                            <p:cond delay="0"/>
+                                          </p:stCondLst>
+                                        </p:cTn>
+                                        <p:tgtEl>
+                                          <p:spTgt spid="3">
+                                            <p:txEl>
+                                              <p:pRg st="0" end="0"/>
+                                            </p:txEl>
+                                          </p:spTgt>
+                                        </p:tgtEl>
+                                        <p:attrNameLst>
+                                          <p:attrName>style.visibility</p:attrName>
+                                        </p:attrNameLst>
+                                      </p:cBhvr>
+                                      <p:to>
+                                        <p:strVal val="visible"/>
+                                      </p:to>
+                                    </p:set>
+                                    <p:anim calcmode="lin" valueType="num">
+                                      <p:cBhvr additive="base">
+                                        <p:cTn id="7" dur="500" fill="hold"/>
+                                        <p:tgtEl>
+                                          <p:spTgt spid="3">
+                                            <p:txEl>
+                                              <p:pRg st="0" end="0"/>
+                                            </p:txEl>
+                                          </p:spTgt>
+                                        </p:tgtEl>
+                                        <p:attrNameLst>
+                                          <p:attrName>ppt_x</p:attrName>
+                                        </p:attrNameLst>
+                                      </p:cBhvr>
+                                      <p:tavLst>
+                                        <p:tav tm="0">
+                                          <p:val>
+                                            <p:strVal val="#ppt_x"/>
+                                          </p:val>
+                                        </p:tav>
+                                        <p:tav tm="100000">
+                                          <p:val>
+                                            <p:strVal val="#ppt_x"/>
+                                          </p:val>
+                                        </p:tav>
+                                      </p:tavLst>
+                                    </p:anim>
+                                    <p:anim calcmode="lin" valueType="num">
+                                      <p:cBhvr additive="base">
+                                        <p:cTn id="8" dur="500" fill="hold"/>
+                                        <p:tgtEl>
+                                          <p:spTgt spid="3">
+                                            <p:txEl>
+                                              <p:pRg st="0" end="0"/>
+                                            </p:txEl>
+                                          </p:spTgt>
+                                        </p:tgtEl>
+                                        <p:attrNameLst>
+                                          <p:attrName>ppt_y</p:attrName>
+                                        </p:attrNameLst>
+                                      </p:cBhvr>
+                                      <p:tavLst>
+                                        <p:tav tm="0">
+                                          <p:val>
+                                            <p:strVal val="1+#ppt_h/2"/>
+                                          </p:val>
+                                        </p:tav>
+                                        <p:tav tm="100000">
+                                          <p:val>
+                                            <p:strVal val="#ppt_y"/>
+                                          </p:val>
+                                        </p:tav>
+                                      </p:tavLst>
+                                    </p:anim>
+                                  </p:childTnLst>
+                                </p:cTn>
+                              </p:par>
+                              <p:par>
+                                <p:cTn id="9" presetID="2" presetClass="entr" presetSubtype="4" fill="hold" grpId="0" nodeType="withEffect">
+                                  <p:stCondLst>
+                                    <p:cond delay="0"/>
+                                  </p:stCondLst>
+                                  <p:childTnLst>
+                                    <p:set>
+                                      <p:cBhvr>
+                                        <p:cTn id="10" dur="1" fill="hold">
+                                          <p:stCondLst>
+                                            <p:cond delay="0"/>
+                                          </p:stCondLst>
+                                        </p:cTn>
+                                        <p:tgtEl>
+                                          <p:spTgt spid="3">
+                                            <p:txEl>
+                                              <p:pRg st="1" end="1"/>
+                                            </p:txEl>
+                                          </p:spTgt>
+                                        </p:tgtEl>
+                                        <p:attrNameLst>
+                                          <p:attrName>style.visibility</p:attrName>
+                                        </p:attrNameLst>
+                                      </p:cBhvr>
+                                      <p:to>
+                                        <p:strVal val="visible"/>
+                                      </p:to>
+                                    </p:set>
+                                    <p:anim calcmode="lin" valueType="num">
+                                      <p:cBhvr additive="base">
+                                        <p:cTn id="11" dur="500" fill="hold"/>
+                                        <p:tgtEl>
+                                          <p:spTgt spid="3">
+                                            <p:txEl>
+                                              <p:pRg st="1" end="1"/>
+                                            </p:txEl>
+                                          </p:spTgt>
+                                        </p:tgtEl>
+                                        <p:attrNameLst>
+                                          <p:attrName>ppt_x</p:attrName>
+                                        </p:attrNameLst>
+                                      </p:cBhvr>
+                                      <p:tavLst>
+                                        <p:tav tm="0">
+                                          <p:val>
+                                            <p:strVal val="#ppt_x"/>
+                                          </p:val>
+                                        </p:tav>
+                                        <p:tav tm="100000">
+                                          <p:val>
+                                            <p:strVal val="#ppt_x"/>
+                                          </p:val>
+                                        </p:tav>
+                                      </p:tavLst>
+                                    </p:anim>
+                                    <p:anim calcmode="lin" valueType="num">
+                                      <p:cBhvr additive="base">
+                                        <p:cTn id="12" dur="500" fill="hold"/>
+                                        <p:tgtEl>
+                                          <p:spTgt spid="3">
+                                            <p:txEl>
+                                              <p:pRg st="1" end="1"/>
+                                            </p:txEl>
+                                          </p:spTgt>
+                                        </p:tgtEl>
+                                        <p:attrNameLst>
+                                          <p:attrName>ppt_y</p:attrName>
+                                        </p:attrNameLst>
+                                      </p:cBhvr>
+                                      <p:tavLst>
+                                        <p:tav tm="0">
+                                          <p:val>
+                                            <p:strVal val="1+#ppt_h/2"/>
+                                          </p:val>
+                                        </p:tav>
+                                        <p:tav tm="100000">
+                                          <p:val>
+                                            <p:strVal val="#ppt_y"/>
+                                          </p:val>
+                                        </p:tav>
+                                      </p:tavLst>
+                                    </p:anim>
+                                  </p:childTnLst>
+                                </p:cTn>
+                              </p:par>
+                              <p:par>
+                                <p:cTn id="13" presetID="2" presetClass="entr" presetSubtype="4" fill="hold" grpId="0" nodeType="withEffect">
+                                  <p:stCondLst>
+                                    <p:cond delay="0"/>
+                                  </p:stCondLst>
+                                  <p:childTnLst>
+                                    <p:set>
+                                      <p:cBhvr>
+                                        <p:cTn id="14" dur="1" fill="hold">
+                                          <p:stCondLst>
+                                            <p:cond delay="0"/>
+                                          </p:stCondLst>
+                                        </p:cTn>
+                                        <p:tgtEl>
+                                          <p:spTgt spid="3">
+                                            <p:txEl>
+                                              <p:pRg st="2" end="2"/>
+                                            </p:txEl>
+                                          </p:spTgt>
+                                        </p:tgtEl>
+                                        <p:attrNameLst>
+                                          <p:attrName>style.visibility</p:attrName>
+                                        </p:attrNameLst>
+                                      </p:cBhvr>
+                                      <p:to>
+                                        <p:strVal val="visible"/>
+                                      </p:to>
+                                    </p:set>
+                                    <p:anim calcmode="lin" valueType="num">
+                                      <p:cBhvr additive="base">
+                                        <p:cTn id="15" dur="500" fill="hold"/>
+                                        <p:tgtEl>
+                                          <p:spTgt spid="3">
+                                            <p:txEl>
+                                              <p:pRg st="2" end="2"/>
+                                            </p:txEl>
+                                          </p:spTgt>
+                                        </p:tgtEl>
+                                        <p:attrNameLst>
+                                          <p:attrName>ppt_x</p:attrName>
+                                        </p:attrNameLst>
+                                      </p:cBhvr>
+                                      <p:tavLst>
+                                        <p:tav tm="0">
+                                          <p:val>
+                                            <p:strVal val="#ppt_x"/>
+                                          </p:val>
+                                        </p:tav>
+                                        <p:tav tm="100000">
+                                          <p:val>
+                                            <p:strVal val="#ppt_x"/>
+                                          </p:val>
+                                        </p:tav>
+                                      </p:tavLst>
+                                    </p:anim>
+                                    <p:anim calcmode="lin" valueType="num">
+                                      <p:cBhvr additive="base">
+                                        <p:cTn id="16" dur="500" fill="hold"/>
+                                        <p:tgtEl>
+                                          <p:spTgt spid="3">
+                                            <p:txEl>
+                                              <p:pRg st="2" end="2"/>
+                                            </p:txEl>
+                                          </p:spTgt>
+                                        </p:tgtEl>
+                                        <p:attrNameLst>
+                                          <p:attrName>ppt_y</p:attrName>
+                                        </p:attrNameLst>
+                                      </p:cBhvr>
+                                      <p:tavLst>
+                                        <p:tav tm="0">
+                                          <p:val>
+                                            <p:strVal val="1+#ppt_h/2"/>
+                                          </p:val>
+                                        </p:tav>
+                                        <p:tav tm="100000">
+                                          <p:val>
+                                            <p:strVal val="#ppt_y"/>
+                                          </p:val>
+                                        </p:tav>
+                                      </p:tavLst>
+                                    </p:anim>
+                                  </p:childTnLst>
+                                </p:cTn>
+                              </p:par>
+                            </p:childTnLst>
+                          </p:cTn>
+                        </p:par>
+                      </p:childTnLst>
+                    </p:cTn>
+                  </p:par>
+                  <p:par>
+                    <p:cTn id="17" fill="hold">
+                      <p:stCondLst>
+                        <p:cond delay="indefinite"/>
+                      </p:stCondLst>
+                      <p:childTnLst>
+                        <p:par>
+                          <p:cTn id="18" fill="hold">
+                            <p:stCondLst>
+                              <p:cond delay="0"/>
+                            </p:stCondLst>
+                            <p:childTnLst>
+                              <p:par>
+                                <p:cTn id="19" presetID="2" presetClass="entr" presetSubtype="4" fill="hold" grpId="0" nodeType="clickEffect">
+                                  <p:stCondLst>
+                                    <p:cond delay="0"/>
+                                  </p:stCondLst>
+                                  <p:childTnLst>
+                                    <p:set>
+                                      <p:cBhvr>
+                                        <p:cTn id="20" dur="1" fill="hold">
+                                          <p:stCondLst>
+                                            <p:cond delay="0"/>
+                                          </p:stCondLst>
+                                        </p:cTn>
+                                        <p:tgtEl>
+                                          <p:spTgt spid="3">
+                                            <p:txEl>
+                                              <p:pRg st="3" end="3"/>
+                                            </p:txEl>
+                                          </p:spTgt>
+                                        </p:tgtEl>
+                                        <p:attrNameLst>
+                                          <p:attrName>style.visibility</p:attrName>
+                                        </p:attrNameLst>
+                                      </p:cBhvr>
+                                      <p:to>
+                                        <p:strVal val="visible"/>
+                                      </p:to>
+                                    </p:set>
+                                    <p:anim calcmode="lin" valueType="num">
+                                      <p:cBhvr additive="base">
+                                        <p:cTn id="21" dur="500" fill="hold"/>
+                                        <p:tgtEl>
+                                          <p:spTgt spid="3">
+                                            <p:txEl>
+                                              <p:pRg st="3" end="3"/>
+                                            </p:txEl>
+                                          </p:spTgt>
+                                        </p:tgtEl>
+                                        <p:attrNameLst>
+                                          <p:attrName>ppt_x</p:attrName>
+                                        </p:attrNameLst>
+                                      </p:cBhvr>
+                                      <p:tavLst>
+                                        <p:tav tm="0">
+                                          <p:val>
+                                            <p:strVal val="#ppt_x"/>
+                                          </p:val>
+                                        </p:tav>
+                                        <p:tav tm="100000">
+                                          <p:val>
+                                            <p:strVal val="#ppt_x"/>
+                                          </p:val>
+                                        </p:tav>
+                                      </p:tavLst>
+                                    </p:anim>
+                                    <p:anim calcmode="lin" valueType="num">
+                                      <p:cBhvr additive="base">
+                                        <p:cTn id="22" dur="500" fill="hold"/>
+                                        <p:tgtEl>
+                                          <p:spTgt spid="3">
+                                            <p:txEl>
+                                              <p:pRg st="3" end="3"/>
+                                            </p:txEl>
+                                          </p:spTgt>
+                                        </p:tgtEl>
+                                        <p:attrNameLst>
+                                          <p:attrName>ppt_y</p:attrName>
+                                        </p:attrNameLst>
+                                      </p:cBhvr>
+                                      <p:tavLst>
+                                        <p:tav tm="0">
+                                          <p:val>
+                                            <p:strVal val="1+#ppt_h/2"/>
+                                          </p:val>
+                                        </p:tav>
+                                        <p:tav tm="100000">
+                                          <p:val>
+                                            <p:strVal val="#ppt_y"/>
+                                          </p:val>
+                                        </p:tav>
+                                      </p:tavLst>
+                                    </p:anim>
+                                  </p:childTnLst>
+                                </p:cTn>
+                              </p:par>
+                              <p:par>
+                                <p:cTn id="23" presetID="2" presetClass="entr" presetSubtype="4" fill="hold" grpId="0" nodeType="withEffect">
+                                  <p:stCondLst>
+                                    <p:cond delay="0"/>
+                                  </p:stCondLst>
+                                  <p:childTnLst>
+                                    <p:set>
+                                      <p:cBhvr>
+                                        <p:cTn id="24" dur="1" fill="hold">
+                                          <p:stCondLst>
+                                            <p:cond delay="0"/>
+                                          </p:stCondLst>
+                                        </p:cTn>
+                                        <p:tgtEl>
+                                          <p:spTgt spid="3">
+                                            <p:txEl>
+                                              <p:pRg st="4" end="4"/>
+                                            </p:txEl>
+                                          </p:spTgt>
+                                        </p:tgtEl>
+                                        <p:attrNameLst>
+                                          <p:attrName>style.visibility</p:attrName>
+                                        </p:attrNameLst>
+                                      </p:cBhvr>
+                                      <p:to>
+                                        <p:strVal val="visible"/>
+                                      </p:to>
+                                    </p:set>
+                                    <p:anim calcmode="lin" valueType="num">
+                                      <p:cBhvr additive="base">
+                                        <p:cTn id="25" dur="500" fill="hold"/>
+                                        <p:tgtEl>
+                                          <p:spTgt spid="3">
+                                            <p:txEl>
+                                              <p:pRg st="4" end="4"/>
+                                            </p:txEl>
+                                          </p:spTgt>
+                                        </p:tgtEl>
+                                        <p:attrNameLst>
+                                          <p:attrName>ppt_x</p:attrName>
+                                        </p:attrNameLst>
+                                      </p:cBhvr>
+                                      <p:tavLst>
+                                        <p:tav tm="0">
+                                          <p:val>
+                                            <p:strVal val="#ppt_x"/>
+                                          </p:val>
+                                        </p:tav>
+                                        <p:tav tm="100000">
+                                          <p:val>
+                                            <p:strVal val="#ppt_x"/>
+                                          </p:val>
+                                        </p:tav>
+                                      </p:tavLst>
+                                    </p:anim>
+                                    <p:anim calcmode="lin" valueType="num">
+                                      <p:cBhvr additive="base">
+                                        <p:cTn id="26" dur="500" fill="hold"/>
+                                        <p:tgtEl>
+                                          <p:spTgt spid="3">
+                                            <p:txEl>
+                                              <p:pRg st="4" end="4"/>
+                                            </p:txEl>
+                                          </p:spTgt>
+                                        </p:tgtEl>
+                                        <p:attrNameLst>
+                                          <p:attrName>ppt_y</p:attrName>
+                                        </p:attrNameLst>
+                                      </p:cBhvr>
+                                      <p:tavLst>
+                                        <p:tav tm="0">
+                                          <p:val>
+                                            <p:strVal val="1+#ppt_h/2"/>
+                                          </p:val>
+                                        </p:tav>
+                                        <p:tav tm="100000">
+                                          <p:val>
+                                            <p:strVal val="#ppt_y"/>
+                                          </p:val>
+                                        </p:tav>
+                                      </p:tavLst>
+                                    </p:anim>
+                                  </p:childTnLst>
+                                </p:cTn>
+                              </p:par>
+                              <p:par>
+                                <p:cTn id="27" presetID="2" presetClass="entr" presetSubtype="4" fill="hold" grpId="0" nodeType="withEffect">
+                                  <p:stCondLst>
+                                    <p:cond delay="0"/>
+                                  </p:stCondLst>
+                                  <p:childTnLst>
+                                    <p:set>
+                                      <p:cBhvr>
+                                        <p:cTn id="28" dur="1" fill="hold">
+                                          <p:stCondLst>
+                                            <p:cond delay="0"/>
+                                          </p:stCondLst>
+                                        </p:cTn>
+                                        <p:tgtEl>
+                                          <p:spTgt spid="3">
+                                            <p:txEl>
+                                              <p:pRg st="5" end="5"/>
+                                            </p:txEl>
+                                          </p:spTgt>
+                                        </p:tgtEl>
+                                        <p:attrNameLst>
+                                          <p:attrName>style.visibility</p:attrName>
+                                        </p:attrNameLst>
+                                      </p:cBhvr>
+                                      <p:to>
+                                        <p:strVal val="visible"/>
+                                      </p:to>
+                                    </p:set>
+                                    <p:anim calcmode="lin" valueType="num">
+                                      <p:cBhvr additive="base">
+                                        <p:cTn id="29" dur="500" fill="hold"/>
+                                        <p:tgtEl>
+                                          <p:spTgt spid="3">
+                                            <p:txEl>
+                                              <p:pRg st="5" end="5"/>
+                                            </p:txEl>
+                                          </p:spTgt>
+                                        </p:tgtEl>
+                                        <p:attrNameLst>
+                                          <p:attrName>ppt_x</p:attrName>
+                                        </p:attrNameLst>
+                                      </p:cBhvr>
+                                      <p:tavLst>
+                                        <p:tav tm="0">
+                                          <p:val>
+                                            <p:strVal val="#ppt_x"/>
+                                          </p:val>
+                                        </p:tav>
+                                        <p:tav tm="100000">
+                                          <p:val>
+                                            <p:strVal val="#ppt_x"/>
+                                          </p:val>
+                                        </p:tav>
+                                      </p:tavLst>
+                                    </p:anim>
+                                    <p:anim calcmode="lin" valueType="num">
+                                      <p:cBhvr additive="base">
+                                        <p:cTn id="30" dur="500" fill="hold"/>
+                                        <p:tgtEl>
+                                          <p:spTgt spid="3">
+                                            <p:txEl>
+                                              <p:pRg st="5" end="5"/>
+                                            </p:txEl>
+                                          </p:spTgt>
+                                        </p:tgtEl>
+                                        <p:attrNameLst>
+                                          <p:attrName>ppt_y</p:attrName>
+                                        </p:attrNameLst>
+                                      </p:cBhvr>
+                                      <p:tavLst>
+                                        <p:tav tm="0">
+                                          <p:val>
+                                            <p:strVal val="1+#ppt_h/2"/>
+                                          </p:val>
+                                        </p:tav>
+                                        <p:tav tm="100000">
+                                          <p:val>
+                                            <p:strVal val="#ppt_y"/>
+                                          </p:val>
+                                        </p:tav>
+                                      </p:tavLst>
+                                    </p:anim>
+                                  </p:childTnLst>
+                                </p:cTn>
+                              </p:par>
+                            </p:childTnLst>
+                          </p:cTn>
+                        </p:par>
+                      </p:childTnLst>
+                    </p:cTn>
+                  </p:par>
+                  <p:par>
+                    <p:cTn id="31" fill="hold">
+                      <p:stCondLst>
+                        <p:cond delay="indefinite"/>
+                      </p:stCondLst>
+                      <p:childTnLst>
+                        <p:par>
+                          <p:cTn id="32" fill="hold">
+                            <p:stCondLst>
+                              <p:cond delay="0"/>
+                            </p:stCondLst>
+                            <p:childTnLst>
+                              <p:par>
+                                <p:cTn id="33" presetID="2" presetClass="entr" presetSubtype="4" fill="hold" grpId="0" nodeType="clickEffect">
+                                  <p:stCondLst>
+                                    <p:cond delay="0"/>
+                                  </p:stCondLst>
+                                  <p:childTnLst>
+                                    <p:set>
+                                      <p:cBhvr>
+                                        <p:cTn id="34" dur="1" fill="hold">
+                                          <p:stCondLst>
+                                            <p:cond delay="0"/>
+                                          </p:stCondLst>
+                                        </p:cTn>
+                                        <p:tgtEl>
+                                          <p:spTgt spid="3">
+                                            <p:txEl>
+                                              <p:pRg st="6" end="6"/>
+                                            </p:txEl>
+                                          </p:spTgt>
+                                        </p:tgtEl>
+                                        <p:attrNameLst>
+                                          <p:attrName>style.visibility</p:attrName>
+                                        </p:attrNameLst>
+                                      </p:cBhvr>
+                                      <p:to>
+                                        <p:strVal val="visible"/>
+                                      </p:to>
+                                    </p:set>
+                                    <p:anim calcmode="lin" valueType="num">
+                                      <p:cBhvr additive="base">
+                                        <p:cTn id="35" dur="500" fill="hold"/>
+                                        <p:tgtEl>
+                                          <p:spTgt spid="3">
+                                            <p:txEl>
+                                              <p:pRg st="6" end="6"/>
+                                            </p:txEl>
+                                          </p:spTgt>
+                                        </p:tgtEl>
+                                        <p:attrNameLst>
+                                          <p:attrName>ppt_x</p:attrName>
+                                        </p:attrNameLst>
+                                      </p:cBhvr>
+                                      <p:tavLst>
+                                        <p:tav tm="0">
+                                          <p:val>
+                                            <p:strVal val="#ppt_x"/>
+                                          </p:val>
+                                        </p:tav>
+                                        <p:tav tm="100000">
+                                          <p:val>
+                                            <p:strVal val="#ppt_x"/>
+                                          </p:val>
+                                        </p:tav>
+                                      </p:tavLst>
+                                    </p:anim>
+                                    <p:anim calcmode="lin" valueType="num">
+                                      <p:cBhvr additive="base">
+                                        <p:cTn id="36" dur="500" fill="hold"/>
+                                        <p:tgtEl>
+                                          <p:spTgt spid="3">
+                                            <p:txEl>
+                                              <p:pRg st="6" end="6"/>
+                                            </p:txEl>
+                                          </p:spTgt>
+                                        </p:tgtEl>
+                                        <p:attrNameLst>
+                                          <p:attrName>ppt_y</p:attrName>
+                                        </p:attrNameLst>
+                                      </p:cBhvr>
+                                      <p:tavLst>
+                                        <p:tav tm="0">
+                                          <p:val>
+                                            <p:strVal val="1+#ppt_h/2"/>
+                                          </p:val>
+                                        </p:tav>
+                                        <p:tav tm="100000">
+                                          <p:val>
+                                            <p:strVal val="#ppt_y"/>
+                                          </p:val>
+                                        </p:tav>
+                                      </p:tavLst>
+                                    </p:anim>
+                                  </p:childTnLst>
+                                </p:cTn>
+                              </p:par>
+                              <p:par>
+                                <p:cTn id="37" presetID="2" presetClass="entr" presetSubtype="4" fill="hold" grpId="0" nodeType="withEffect">
+                                  <p:stCondLst>
+                                    <p:cond delay="0"/>
+                                  </p:stCondLst>
+                                  <p:childTnLst>
+                                    <p:set>
+                                      <p:cBhvr>
+                                        <p:cTn id="38" dur="1" fill="hold">
+                                          <p:stCondLst>
+                                            <p:cond delay="0"/>
+                                          </p:stCondLst>
+                                        </p:cTn>
+                                        <p:tgtEl>
+                                          <p:spTgt spid="3">
+                                            <p:txEl>
+                                              <p:pRg st="7" end="7"/>
+                                            </p:txEl>
+                                          </p:spTgt>
+                                        </p:tgtEl>
+                                        <p:attrNameLst>
+                                          <p:attrName>style.visibility</p:attrName>
+                                        </p:attrNameLst>
+                                      </p:cBhvr>
+                                      <p:to>
+                                        <p:strVal val="visible"/>
+                                      </p:to>
+                                    </p:set>
+                                    <p:anim calcmode="lin" valueType="num">
+                                      <p:cBhvr additive="base">
+                                        <p:cTn id="39" dur="500" fill="hold"/>
+                                        <p:tgtEl>
+                                          <p:spTgt spid="3">
+                                            <p:txEl>
+                                              <p:pRg st="7" end="7"/>
+                                            </p:txEl>
+                                          </p:spTgt>
+                                        </p:tgtEl>
+                                        <p:attrNameLst>
+                                          <p:attrName>ppt_x</p:attrName>
+                                        </p:attrNameLst>
+                                      </p:cBhvr>
+                                      <p:tavLst>
+                                        <p:tav tm="0">
+                                          <p:val>
+                                            <p:strVal val="#ppt_x"/>
+                                          </p:val>
+                                        </p:tav>
+                                        <p:tav tm="100000">
+                                          <p:val>
+                                            <p:strVal val="#ppt_x"/>
+                                          </p:val>
+                                        </p:tav>
+                                      </p:tavLst>
+                                    </p:anim>
+                                    <p:anim calcmode="lin" valueType="num">
+                                      <p:cBhvr additive="base">
+                                        <p:cTn id="40" dur="500" fill="hold"/>
+                                        <p:tgtEl>
+                                          <p:spTgt spid="3">
+                                            <p:txEl>
+                                              <p:pRg st="7" end="7"/>
+                                            </p:txEl>
+                                          </p:spTgt>
+                                        </p:tgtEl>
+                                        <p:attrNameLst>
+                                          <p:attrName>ppt_y</p:attrName>
+                                        </p:attrNameLst>
+                                      </p:cBhvr>
+                                      <p:tavLst>
+                                        <p:tav tm="0">
+                                          <p:val>
+                                            <p:strVal val="1+#ppt_h/2"/>
+                                          </p:val>
+                                        </p:tav>
+                                        <p:tav tm="100000">
+                                          <p:val>
+                                            <p:strVal val="#ppt_y"/>
+                                          </p:val>
+                                        </p:tav>
+                                      </p:tavLst>
+                                    </p:anim>
+                                  </p:childTnLst>
+                                </p:cTn>
+                              </p:par>
+                              <p:par>
+                                <p:cTn id="41" presetID="2" presetClass="entr" presetSubtype="4" fill="hold" grpId="0" nodeType="withEffect">
+                                  <p:stCondLst>
+                                    <p:cond delay="0"/>
+                                  </p:stCondLst>
+                                  <p:childTnLst>
+                                    <p:set>
+                                      <p:cBhvr>
+                                        <p:cTn id="42" dur="1" fill="hold">
+                                          <p:stCondLst>
+                                            <p:cond delay="0"/>
+                                          </p:stCondLst>
+                                        </p:cTn>
+                                        <p:tgtEl>
+                                          <p:spTgt spid="3">
+                                            <p:txEl>
+                                              <p:pRg st="8" end="8"/>
+                                            </p:txEl>
+                                          </p:spTgt>
+                                        </p:tgtEl>
+                                        <p:attrNameLst>
+                                          <p:attrName>style.visibility</p:attrName>
+                                        </p:attrNameLst>
+                                      </p:cBhvr>
+                                      <p:to>
+                                        <p:strVal val="visible"/>
+                                      </p:to>
+                                    </p:set>
+                                    <p:anim calcmode="lin" valueType="num">
+                                      <p:cBhvr additive="base">
+                                        <p:cTn id="43" dur="500" fill="hold"/>
+                                        <p:tgtEl>
+                                          <p:spTgt spid="3">
+                                            <p:txEl>
+                                              <p:pRg st="8" end="8"/>
+                                            </p:txEl>
+                                          </p:spTgt>
+                                        </p:tgtEl>
+                                        <p:attrNameLst>
+                                          <p:attrName>ppt_x</p:attrName>
+                                        </p:attrNameLst>
+                                      </p:cBhvr>
+                                      <p:tavLst>
+                                        <p:tav tm="0">
+                                          <p:val>
+                                            <p:strVal val="#ppt_x"/>
+                                          </p:val>
+                                        </p:tav>
+                                        <p:tav tm="100000">
+                                          <p:val>
+                                            <p:strVal val="#ppt_x"/>
+                                          </p:val>
+                                        </p:tav>
+                                      </p:tavLst>
+                                    </p:anim>
+                                    <p:anim calcmode="lin" valueType="num">
+                                      <p:cBhvr additive="base">
+                                        <p:cTn id="44" dur="500" fill="hold"/>
+                                        <p:tgtEl>
+                                          <p:spTgt spid="3">
+                                            <p:txEl>
+                                              <p:pRg st="8" end="8"/>
+                                            </p:txEl>
+                                          </p:spTgt>
+                                        </p:tgtEl>
+                                        <p:attrNameLst>
+                                          <p:attrName>ppt_y</p:attrName>
+                                        </p:attrNameLst>
+                                      </p:cBhvr>
+                                      <p:tavLst>
+                                        <p:tav tm="0">
+                                          <p:val>
+                                            <p:strVal val="1+#ppt_h/2"/>
+                                          </p:val>
+                                        </p:tav>
+                                        <p:tav tm="100000">
+                                          <p:val>
+                                            <p:strVal val="#ppt_y"/>
+                                          </p:val>
+                                        </p:tav>
+                                      </p:tavLst>
+                                    </p:anim>
+                                  </p:childTnLst>
+                                </p:cTn>
+                              </p:par>
+                            </p:childTnLst>
+                          </p:cTn>
+                        </p:par>
+                      </p:childTnLst>
+                    </p:cTn>
+                  </p:par>
+                  <p:par>
+                    <p:cTn id="45" fill="hold">
+                      <p:stCondLst>
+                        <p:cond delay="indefinite"/>
+                      </p:stCondLst>
+                      <p:childTnLst>
+                        <p:par>
+                          <p:cTn id="46" fill="hold">
+                            <p:stCondLst>
+                              <p:cond delay="0"/>
+                            </p:stCondLst>
+                            <p:childTnLst>
+                              <p:par>
+                                <p:cTn id="47" presetID="2" presetClass="entr" presetSubtype="4" fill="hold" grpId="0" nodeType="clickEffect">
+                                  <p:stCondLst>
+                                    <p:cond delay="0"/>
+                                  </p:stCondLst>
+                                  <p:childTnLst>
+                                    <p:set>
+                                      <p:cBhvr>
+                                        <p:cTn id="48" dur="1" fill="hold">
+                                          <p:stCondLst>
+                                            <p:cond delay="0"/>
+                                          </p:stCondLst>
+                                        </p:cTn>
+                                        <p:tgtEl>
+                                          <p:spTgt spid="3">
+                                            <p:txEl>
+                                              <p:pRg st="9" end="9"/>
+                                            </p:txEl>
+                                          </p:spTgt>
+                                        </p:tgtEl>
+                                        <p:attrNameLst>
+                                          <p:attrName>style.visibility</p:attrName>
+                                        </p:attrNameLst>
+                                      </p:cBhvr>
+                                      <p:to>
+                                        <p:strVal val="visible"/>
+                                      </p:to>
+                                    </p:set>
+                                    <p:anim calcmode="lin" valueType="num">
+                                      <p:cBhvr additive="base">
+                                        <p:cTn id="49" dur="500" fill="hold"/>
+                                        <p:tgtEl>
+                                          <p:spTgt spid="3">
+                                            <p:txEl>
+                                              <p:pRg st="9" end="9"/>
+                                            </p:txEl>
+                                          </p:spTgt>
+                                        </p:tgtEl>
+                                        <p:attrNameLst>
+                                          <p:attrName>ppt_x</p:attrName>
+                                        </p:attrNameLst>
+                                      </p:cBhvr>
+                                      <p:tavLst>
+                                        <p:tav tm="0">
+                                          <p:val>
+                                            <p:strVal val="#ppt_x"/>
+                                          </p:val>
+                                        </p:tav>
+                                        <p:tav tm="100000">
+                                          <p:val>
+                                            <p:strVal val="#ppt_x"/>
+                                          </p:val>
+                                        </p:tav>
+                                      </p:tavLst>
+                                    </p:anim>
+                                    <p:anim calcmode="lin" valueType="num">
+                                      <p:cBhvr additive="base">
+                                        <p:cTn id="50" dur="500" fill="hold"/>
+                                        <p:tgtEl>
+                                          <p:spTgt spid="3">
+                                            <p:txEl>
+                                              <p:pRg st="9" end="9"/>
+                                            </p:txEl>
+                                          </p:spTgt>
+                                        </p:tgtEl>
+                                        <p:attrNameLst>
+                                          <p:attrName>ppt_y</p:attrName>
+                                        </p:attrNameLst>
+                                      </p:cBhvr>
+                                      <p:tavLst>
+                                        <p:tav tm="0">
+                                          <p:val>
+                                            <p:strVal val="1+#ppt_h/2"/>
+                                          </p:val>
+                                        </p:tav>
+                                        <p:tav tm="100000">
+                                          <p:val>
+                                            <p:strVal val="#ppt_y"/>
+                                          </p:val>
+                                        </p:tav>
+                                      </p:tavLst>
+                                    </p:anim>
+                                  </p:childTnLst>
+                                </p:cTn>
+                              </p:par>
+                              <p:par>
+                                <p:cTn id="51" presetID="2" presetClass="entr" presetSubtype="4" fill="hold" grpId="0" nodeType="withEffect">
+                                  <p:stCondLst>
+                                    <p:cond delay="0"/>
+                                  </p:stCondLst>
+                                  <p:childTnLst>
+                                    <p:set>
+                                      <p:cBhvr>
+                                        <p:cTn id="52" dur="1" fill="hold">
+                                          <p:stCondLst>
+                                            <p:cond delay="0"/>
+                                          </p:stCondLst>
+                                        </p:cTn>
+                                        <p:tgtEl>
+                                          <p:spTgt spid="3">
+                                            <p:txEl>
+                                              <p:pRg st="10" end="10"/>
+                                            </p:txEl>
+                                          </p:spTgt>
+                                        </p:tgtEl>
+                                        <p:attrNameLst>
+                                          <p:attrName>style.visibility</p:attrName>
+                                        </p:attrNameLst>
+                                      </p:cBhvr>
+                                      <p:to>
+                                        <p:strVal val="visible"/>
+                                      </p:to>
+                                    </p:set>
+                                    <p:anim calcmode="lin" valueType="num">
+                                      <p:cBhvr additive="base">
+                                        <p:cTn id="53" dur="500" fill="hold"/>
+                                        <p:tgtEl>
+                                          <p:spTgt spid="3">
+                                            <p:txEl>
+                                              <p:pRg st="10" end="10"/>
+                                            </p:txEl>
+                                          </p:spTgt>
+                                        </p:tgtEl>
+                                        <p:attrNameLst>
+                                          <p:attrName>ppt_x</p:attrName>
+                                        </p:attrNameLst>
+                                      </p:cBhvr>
+                                      <p:tavLst>
+                                        <p:tav tm="0">
+                                          <p:val>
+                                            <p:strVal val="#ppt_x"/>
+                                          </p:val>
+                                        </p:tav>
+                                        <p:tav tm="100000">
+                                          <p:val>
+                                            <p:strVal val="#ppt_x"/>
+                                          </p:val>
+                                        </p:tav>
+                                      </p:tavLst>
+                                    </p:anim>
+                                    <p:anim calcmode="lin" valueType="num">
+                                      <p:cBhvr additive="base">
+                                        <p:cTn id="54" dur="500" fill="hold"/>
+                                        <p:tgtEl>
+                                          <p:spTgt spid="3">
+                                            <p:txEl>
+                                              <p:pRg st="10" end="10"/>
+                                            </p:txEl>
+                                          </p:spTgt>
+                                        </p:tgtEl>
+                                        <p:attrNameLst>
+                                          <p:attrName>ppt_y</p:attrName>
+                                        </p:attrNameLst>
+                                      </p:cBhvr>
+                                      <p:tavLst>
+                                        <p:tav tm="0">
+                                          <p:val>
+                                            <p:strVal val="1+#ppt_h/2"/>
+                                          </p:val>
+                                        </p:tav>
+                                        <p:tav tm="100000">
+                                          <p:val>
+                                            <p:strVal val="#ppt_y"/>
+                                          </p:val>
+                                        </p:tav>
+                                      </p:tavLst>
+                                    </p:anim>
+                                  </p:childTnLst>
+                                </p:cTn>
+                              </p:par>
+                              <p:par>
+                                <p:cTn id="55" presetID="2" presetClass="entr" presetSubtype="4" fill="hold" grpId="0" nodeType="withEffect">
+                                  <p:stCondLst>
+                                    <p:cond delay="0"/>
+                                  </p:stCondLst>
+                                  <p:childTnLst>
+                                    <p:set>
+                                      <p:cBhvr>
+                                        <p:cTn id="56" dur="1" fill="hold">
+                                          <p:stCondLst>
+                                            <p:cond delay="0"/>
+                                          </p:stCondLst>
+                                        </p:cTn>
+                                        <p:tgtEl>
+                                          <p:spTgt spid="3">
+                                            <p:txEl>
+                                              <p:pRg st="11" end="11"/>
+                                            </p:txEl>
+                                          </p:spTgt>
+                                        </p:tgtEl>
+                                        <p:attrNameLst>
+                                          <p:attrName>style.visibility</p:attrName>
+                                        </p:attrNameLst>
+                                      </p:cBhvr>
+                                      <p:to>
+                                        <p:strVal val="visible"/>
+                                      </p:to>
+                                    </p:set>
+                                    <p:anim calcmode="lin" valueType="num">
+                                      <p:cBhvr additive="base">
+                                        <p:cTn id="57" dur="500" fill="hold"/>
+                                        <p:tgtEl>
+                                          <p:spTgt spid="3">
+                                            <p:txEl>
+                                              <p:pRg st="11" end="11"/>
+                                            </p:txEl>
+                                          </p:spTgt>
+                                        </p:tgtEl>
+                                        <p:attrNameLst>
+                                          <p:attrName>ppt_x</p:attrName>
+                                        </p:attrNameLst>
+                                      </p:cBhvr>
+                                      <p:tavLst>
+                                        <p:tav tm="0">
+                                          <p:val>
+                                            <p:strVal val="#ppt_x"/>
+                                          </p:val>
+                                        </p:tav>
+                                        <p:tav tm="100000">
+                                          <p:val>
+                                            <p:strVal val="#ppt_x"/>
+                                          </p:val>
+                                        </p:tav>
+                                      </p:tavLst>
+                                    </p:anim>
+                                    <p:anim calcmode="lin" valueType="num">
+                                      <p:cBhvr additive="base">
+                                        <p:cTn id="58" dur="500" fill="hold"/>
+                                        <p:tgtEl>
+                                          <p:spTgt spid="3">
+                                            <p:txEl>
+                                              <p:pRg st="11" end="11"/>
+                                            </p:txEl>
+                                          </p:spTgt>
+                                        </p:tgtEl>
+                                        <p:attrNameLst>
+                                          <p:attrName>ppt_y</p:attrName>
+                                        </p:attrNameLst>
+                                      </p:cBhvr>
+                                      <p:tavLst>
+                                        <p:tav tm="0">
+                                          <p:val>
+                                            <p:strVal val="1+#ppt_h/2"/>
+                                          </p:val>
+                                        </p:tav>
+                                        <p:tav tm="100000">
+                                          <p:val>
+                                            <p:strVal val="#ppt_y"/>
+                                          </p:val>
+                                        </p:tav>
+                                      </p:tavLst>
+                                    </p:anim>
+                                  </p:childTnLst>
+                                </p:cTn>
+                              </p:par>
+                              <p:par>
+                                <p:cTn id="59" presetID="2" presetClass="entr" presetSubtype="4" fill="hold" grpId="0" nodeType="withEffect">
+                                  <p:stCondLst>
+                                    <p:cond delay="0"/>
+                                  </p:stCondLst>
+                                  <p:childTnLst>
+                                    <p:set>
+                                      <p:cBhvr>
+                                        <p:cTn id="60" dur="1" fill="hold">
+                                          <p:stCondLst>
+                                            <p:cond delay="0"/>
+                                          </p:stCondLst>
+                                        </p:cTn>
+                                        <p:tgtEl>
+                                          <p:spTgt spid="3">
+                                            <p:txEl>
+                                              <p:pRg st="12" end="12"/>
+                                            </p:txEl>
+                                          </p:spTgt>
+                                        </p:tgtEl>
+                                        <p:attrNameLst>
+                                          <p:attrName>style.visibility</p:attrName>
+                                        </p:attrNameLst>
+                                      </p:cBhvr>
+                                      <p:to>
+                                        <p:strVal val="visible"/>
+                                      </p:to>
+                                    </p:set>
+                                    <p:anim calcmode="lin" valueType="num">
+                                      <p:cBhvr additive="base">
+                                        <p:cTn id="61" dur="500" fill="hold"/>
+                                        <p:tgtEl>
+                                          <p:spTgt spid="3">
+                                            <p:txEl>
+                                              <p:pRg st="12" end="12"/>
+                                            </p:txEl>
+                                          </p:spTgt>
+                                        </p:tgtEl>
+                                        <p:attrNameLst>
+                                          <p:attrName>ppt_x</p:attrName>
+                                        </p:attrNameLst>
+                                      </p:cBhvr>
+                                      <p:tavLst>
+                                        <p:tav tm="0">
+                                          <p:val>
+                                            <p:strVal val="#ppt_x"/>
+                                          </p:val>
+                                        </p:tav>
+                                        <p:tav tm="100000">
+                                          <p:val>
+                                            <p:strVal val="#ppt_x"/>
+                                          </p:val>
+                                        </p:tav>
+                                      </p:tavLst>
+                                    </p:anim>
+                                    <p:anim calcmode="lin" valueType="num">
+                                      <p:cBhvr additive="base">
+                                        <p:cTn id="62" dur="500" fill="hold"/>
+                                        <p:tgtEl>
+                                          <p:spTgt spid="3">
+                                            <p:txEl>
+                                              <p:pRg st="12" end="12"/>
+                                            </p:txEl>
+                                          </p:spTgt>
+                                        </p:tgtEl>
+                                        <p:attrNameLst>
+                                          <p:attrName>ppt_y</p:attrName>
+                                        </p:attrNameLst>
+                                      </p:cBhvr>
+                                      <p:tavLst>
+                                        <p:tav tm="0">
+                                          <p:val>
+                                            <p:strVal val="1+#ppt_h/2"/>
+                                          </p:val>
+                                        </p:tav>
+                                        <p:tav tm="100000">
+                                          <p:val>
+                                            <p:strVal val="#ppt_y"/>
+                                          </p:val>
+                                        </p:tav>
+                                      </p:tavLst>
+                                    </p:anim>
+                                  </p:childTnLst>
+                                </p:cTn>
+                              </p:par>
+                              <p:par>
+                                <p:cTn id="63" presetID="2" presetClass="entr" presetSubtype="4" fill="hold" grpId="0" nodeType="withEffect">
+                                  <p:stCondLst>
+                                    <p:cond delay="0"/>
+                                  </p:stCondLst>
+                                  <p:childTnLst>
+                                    <p:set>
+                                      <p:cBhvr>
+                                        <p:cTn id="64" dur="1" fill="hold">
+                                          <p:stCondLst>
+                                            <p:cond delay="0"/>
+                                          </p:stCondLst>
+                                        </p:cTn>
+                                        <p:tgtEl>
+                                          <p:spTgt spid="3">
+                                            <p:txEl>
+                                              <p:pRg st="13" end="13"/>
+                                            </p:txEl>
+                                          </p:spTgt>
+                                        </p:tgtEl>
+                                        <p:attrNameLst>
+                                          <p:attrName>style.visibility</p:attrName>
+                                        </p:attrNameLst>
+                                      </p:cBhvr>
+                                      <p:to>
+                                        <p:strVal val="visible"/>
+                                      </p:to>
+                                    </p:set>
+                                    <p:anim calcmode="lin" valueType="num">
+                                      <p:cBhvr additive="base">
+                                        <p:cTn id="65" dur="500" fill="hold"/>
+                                        <p:tgtEl>
+                                          <p:spTgt spid="3">
+                                            <p:txEl>
+                                              <p:pRg st="13" end="13"/>
+                                            </p:txEl>
+                                          </p:spTgt>
+                                        </p:tgtEl>
+                                        <p:attrNameLst>
+                                          <p:attrName>ppt_x</p:attrName>
+                                        </p:attrNameLst>
+                                      </p:cBhvr>
+                                      <p:tavLst>
+                                        <p:tav tm="0">
+                                          <p:val>
+                                            <p:strVal val="#ppt_x"/>
+                                          </p:val>
+                                        </p:tav>
+                                        <p:tav tm="100000">
+                                          <p:val>
+                                            <p:strVal val="#ppt_x"/>
+                                          </p:val>
+                                        </p:tav>
+                                      </p:tavLst>
+                                    </p:anim>
+                                    <p:anim calcmode="lin" valueType="num">
+                                      <p:cBhvr additive="base">
+                                        <p:cTn id="66" dur="500" fill="hold"/>
+                                        <p:tgtEl>
+                                          <p:spTgt spid="3">
+                                            <p:txEl>
+                                              <p:pRg st="13" end="13"/>
+                                            </p:txEl>
+                                          </p:spTgt>
+                                        </p:tgtEl>
+                                        <p:attrNameLst>
+                                          <p:attrName>ppt_y</p:attrName>
+                                        </p:attrNameLst>
+                                      </p:cBhvr>
+                                      <p:tavLst>
+                                        <p:tav tm="0">
+                                          <p:val>
+                                            <p:strVal val="1+#ppt_h/2"/>
+                                          </p:val>
+                                        </p:tav>
+                                        <p:tav tm="100000">
+                                          <p:val>
+                                            <p:strVal val="#ppt_y"/>
+                                          </p:val>
+                                        </p:tav>
+                                      </p:tavLst>
+                                    </p:anim>
+                                  </p:childTnLst>
+                                </p:cTn>
+                              </p:par>
+                            </p:childTnLst>
+                          </p:cTn>
+                        </p:par>
+                      </p:childTnLst>
+                    </p:cTn>
+                  </p:par>
+                  <p:par>
+                    <p:cTn id="67" fill="hold">
+                      <p:stCondLst>
+                        <p:cond delay="indefinite"/>
+                      </p:stCondLst>
+                      <p:childTnLst>
+                        <p:par>
+                          <p:cTn id="68" fill="hold">
+                            <p:stCondLst>
+                              <p:cond delay="0"/>
+                            </p:stCondLst>
+                            <p:childTnLst>
+                              <p:par>
+                                <p:cTn id="69" presetID="2" presetClass="entr" presetSubtype="4" fill="hold" grpId="0" nodeType="clickEffect">
+                                  <p:stCondLst>
+                                    <p:cond delay="0"/>
+                                  </p:stCondLst>
+                                  <p:childTnLst>
+                                    <p:set>
+                                      <p:cBhvr>
+                                        <p:cTn id="70" dur="1" fill="hold">
+                                          <p:stCondLst>
+                                            <p:cond delay="0"/>
+                                          </p:stCondLst>
+                                        </p:cTn>
+                                        <p:tgtEl>
+                                          <p:spTgt spid="3">
+                                            <p:txEl>
+                                              <p:pRg st="14" end="14"/>
+                                            </p:txEl>
+                                          </p:spTgt>
+                                        </p:tgtEl>
+                                        <p:attrNameLst>
+                                          <p:attrName>style.visibility</p:attrName>
+                                        </p:attrNameLst>
+                                      </p:cBhvr>
+                                      <p:to>
+                                        <p:strVal val="visible"/>
+                                      </p:to>
+                                    </p:set>
+                                    <p:anim calcmode="lin" valueType="num">
+                                      <p:cBhvr additive="base">
+                                        <p:cTn id="71" dur="500" fill="hold"/>
+                                        <p:tgtEl>
+                                          <p:spTgt spid="3">
+                                            <p:txEl>
+                                              <p:pRg st="14" end="14"/>
+                                            </p:txEl>
+                                          </p:spTgt>
+                                        </p:tgtEl>
+                                        <p:attrNameLst>
+                                          <p:attrName>ppt_x</p:attrName>
+                                        </p:attrNameLst>
+                                      </p:cBhvr>
+                                      <p:tavLst>
+                                        <p:tav tm="0">
+                                          <p:val>
+                                            <p:strVal val="#ppt_x"/>
+                                          </p:val>
+                                        </p:tav>
+                                        <p:tav tm="100000">
+                                          <p:val>
+                                            <p:strVal val="#ppt_x"/>
+                                          </p:val>
+                                        </p:tav>
+                                      </p:tavLst>
+                                    </p:anim>
+                                    <p:anim calcmode="lin" valueType="num">
+                                      <p:cBhvr additive="base">
+                                        <p:cTn id="72" dur="500" fill="hold"/>
+                                        <p:tgtEl>
+                                          <p:spTgt spid="3">
+                                            <p:txEl>
+                                              <p:pRg st="14" end="14"/>
+                                            </p:txEl>
+                                          </p:spTgt>
+                                        </p:tgtEl>
+                                        <p:attrNameLst>
+                                          <p:attrName>ppt_y</p:attrName>
+                                        </p:attrNameLst>
+                                      </p:cBhvr>
+                                      <p:tavLst>
+                                        <p:tav tm="0">
+                                          <p:val>
+                                            <p:strVal val="1+#ppt_h/2"/>
+                                          </p:val>
+                                        </p:tav>
+                                        <p:tav tm="100000">
+                                          <p:val>
+                                            <p:strVal val="#ppt_y"/>
+                                          </p:val>
+                                        </p:tav>
+                                      </p:tavLst>
+                                    </p:anim>
+                                  </p:childTnLst>
+                                </p:cTn>
+                              </p:par>
+                              <p:par>
+                                <p:cTn id="73" presetID="2" presetClass="entr" presetSubtype="4" fill="hold" grpId="0" nodeType="withEffect">
+                                  <p:stCondLst>
+                                    <p:cond delay="0"/>
+                                  </p:stCondLst>
+                                  <p:childTnLst>
+                                    <p:set>
+                                      <p:cBhvr>
+                                        <p:cTn id="74" dur="1" fill="hold">
+                                          <p:stCondLst>
+                                            <p:cond delay="0"/>
+                                          </p:stCondLst>
+                                        </p:cTn>
+                                        <p:tgtEl>
+                                          <p:spTgt spid="3">
+                                            <p:txEl>
+                                              <p:pRg st="15" end="15"/>
+                                            </p:txEl>
+                                          </p:spTgt>
+                                        </p:tgtEl>
+                                        <p:attrNameLst>
+                                          <p:attrName>style.visibility</p:attrName>
+                                        </p:attrNameLst>
+                                      </p:cBhvr>
+                                      <p:to>
+                                        <p:strVal val="visible"/>
+                                      </p:to>
+                                    </p:set>
+                                    <p:anim calcmode="lin" valueType="num">
+                                      <p:cBhvr additive="base">
+                                        <p:cTn id="75" dur="500" fill="hold"/>
+                                        <p:tgtEl>
+                                          <p:spTgt spid="3">
+                                            <p:txEl>
+                                              <p:pRg st="15" end="15"/>
+                                            </p:txEl>
+                                          </p:spTgt>
+                                        </p:tgtEl>
+                                        <p:attrNameLst>
+                                          <p:attrName>ppt_x</p:attrName>
+                                        </p:attrNameLst>
+                                      </p:cBhvr>
+                                      <p:tavLst>
+                                        <p:tav tm="0">
+                                          <p:val>
+                                            <p:strVal val="#ppt_x"/>
+                                          </p:val>
+                                        </p:tav>
+                                        <p:tav tm="100000">
+                                          <p:val>
+                                            <p:strVal val="#ppt_x"/>
+                                          </p:val>
+                                        </p:tav>
+                                      </p:tavLst>
+                                    </p:anim>
+                                    <p:anim calcmode="lin" valueType="num">
+                                      <p:cBhvr additive="base">
+                                        <p:cTn id="76" dur="500" fill="hold"/>
+                                        <p:tgtEl>
+                                          <p:spTgt spid="3">
+                                            <p:txEl>
+                                              <p:pRg st="15" end="15"/>
+                                            </p:txEl>
+                                          </p:spTgt>
+                                        </p:tgtEl>
+                                        <p:attrNameLst>
+                                          <p:attrName>ppt_y</p:attrName>
+                                        </p:attrNameLst>
+                                      </p:cBhvr>
+                                      <p:tavLst>
+                                        <p:tav tm="0">
+                                          <p:val>
+                                            <p:strVal val="1+#ppt_h/2"/>
+                                          </p:val>
+                                        </p:tav>
+                                        <p:tav tm="100000">
+                                          <p:val>
+                                            <p:strVal val="#ppt_y"/>
+                                          </p:val>
+                                        </p:tav>
+                                      </p:tavLst>
+                                    </p:anim>
+                                  </p:childTnLst>
+                                </p:cTn>
+                              </p:par>
+                              <p:par>
+                                <p:cTn id="77" presetID="2" presetClass="entr" presetSubtype="4" fill="hold" grpId="0" nodeType="withEffect">
+                                  <p:stCondLst>
+                                    <p:cond delay="0"/>
+                                  </p:stCondLst>
+                                  <p:childTnLst>
+                                    <p:set>
+                                      <p:cBhvr>
+                                        <p:cTn id="78" dur="1" fill="hold">
+                                          <p:stCondLst>
+                                            <p:cond delay="0"/>
+                                          </p:stCondLst>
+                                        </p:cTn>
+                                        <p:tgtEl>
+                                          <p:spTgt spid="3">
+                                            <p:txEl>
+                                              <p:pRg st="16" end="16"/>
+                                            </p:txEl>
+                                          </p:spTgt>
+                                        </p:tgtEl>
+                                        <p:attrNameLst>
+                                          <p:attrName>style.visibility</p:attrName>
+                                        </p:attrNameLst>
+                                      </p:cBhvr>
+                                      <p:to>
+                                        <p:strVal val="visible"/>
+                                      </p:to>
+                                    </p:set>
+                                    <p:anim calcmode="lin" valueType="num">
+                                      <p:cBhvr additive="base">
+                                        <p:cTn id="79" dur="500" fill="hold"/>
+                                        <p:tgtEl>
+                                          <p:spTgt spid="3">
+                                            <p:txEl>
+                                              <p:pRg st="16" end="16"/>
+                                            </p:txEl>
+                                          </p:spTgt>
+                                        </p:tgtEl>
+                                        <p:attrNameLst>
+                                          <p:attrName>ppt_x</p:attrName>
+                                        </p:attrNameLst>
+                                      </p:cBhvr>
+                                      <p:tavLst>
+                                        <p:tav tm="0">
+                                          <p:val>
+                                            <p:strVal val="#ppt_x"/>
+                                          </p:val>
+                                        </p:tav>
+                                        <p:tav tm="100000">
+                                          <p:val>
+                                            <p:strVal val="#ppt_x"/>
+                                          </p:val>
+                                        </p:tav>
+                                      </p:tavLst>
+                                    </p:anim>
+                                    <p:anim calcmode="lin" valueType="num">
+                                      <p:cBhvr additive="base">
+                                        <p:cTn id="80" dur="500" fill="hold"/>
+                                        <p:tgtEl>
+                                          <p:spTgt spid="3">
+                                            <p:txEl>
+                                              <p:pRg st="16" end="16"/>
+                                            </p:txEl>
+                                          </p:spTgt>
+                                        </p:tgtEl>
+                                        <p:attrNameLst>
+                                          <p:attrName>ppt_y</p:attrName>
+                                        </p:attrNameLst>
+                                      </p:cBhvr>
+                                      <p:tavLst>
+                                        <p:tav tm="0">
+                                          <p:val>
+                                            <p:strVal val="1+#ppt_h/2"/>
+                                          </p:val>
+                                        </p:tav>
+                                        <p:tav tm="100000">
+                                          <p:val>
+                                            <p:strVal val="#ppt_y"/>
+                                          </p:val>
+                                        </p:tav>
+                                      </p:tavLst>
+                                    </p:anim>
+                                  </p:childTnLst>
+                                </p:cTn>
+                              </p:par>
+                              <p:par>
+                                <p:cTn id="81" presetID="2" presetClass="entr" presetSubtype="4" fill="hold" grpId="0" nodeType="withEffect">
+                                  <p:stCondLst>
+                                    <p:cond delay="0"/>
+                                  </p:stCondLst>
+                                  <p:childTnLst>
+                                    <p:set>
+                                      <p:cBhvr>
+                                        <p:cTn id="82" dur="1" fill="hold">
+                                          <p:stCondLst>
+                                            <p:cond delay="0"/>
+                                          </p:stCondLst>
+                                        </p:cTn>
+                                        <p:tgtEl>
+                                          <p:spTgt spid="3">
+                                            <p:txEl>
+                                              <p:pRg st="17" end="17"/>
+                                            </p:txEl>
+                                          </p:spTgt>
+                                        </p:tgtEl>
+                                        <p:attrNameLst>
+                                          <p:attrName>style.visibility</p:attrName>
+                                        </p:attrNameLst>
+                                      </p:cBhvr>
+                                      <p:to>
+                                        <p:strVal val="visible"/>
+                                      </p:to>
+                                    </p:set>
+                                    <p:anim calcmode="lin" valueType="num">
+                                      <p:cBhvr additive="base">
+                                        <p:cTn id="83" dur="500" fill="hold"/>
+                                        <p:tgtEl>
+                                          <p:spTgt spid="3">
+                                            <p:txEl>
+                                              <p:pRg st="17" end="17"/>
+                                            </p:txEl>
+                                          </p:spTgt>
+                                        </p:tgtEl>
+                                        <p:attrNameLst>
+                                          <p:attrName>ppt_x</p:attrName>
+                                        </p:attrNameLst>
+                                      </p:cBhvr>
+                                      <p:tavLst>
+                                        <p:tav tm="0">
+                                          <p:val>
+                                            <p:strVal val="#ppt_x"/>
+                                          </p:val>
+                                        </p:tav>
+                                        <p:tav tm="100000">
+                                          <p:val>
+                                            <p:strVal val="#ppt_x"/>
+                                          </p:val>
+                                        </p:tav>
+                                      </p:tavLst>
+                                    </p:anim>
+                                    <p:anim calcmode="lin" valueType="num">
+                                      <p:cBhvr additive="base">
+                                        <p:cTn id="84" dur="500" fill="hold"/>
+                                        <p:tgtEl>
+                                          <p:spTgt spid="3">
+                                            <p:txEl>
+                                              <p:pRg st="17" end="17"/>
+                                            </p:txEl>
+                                          </p:spTgt>
+                                        </p:tgtEl>
+                                        <p:attrNameLst>
+                                          <p:attrName>ppt_y</p:attrName>
+                                        </p:attrNameLst>
+                                      </p:cBhvr>
+                                      <p:tavLst>
+                                        <p:tav tm="0">
+                                          <p:val>
+                                            <p:strVal val="1+#ppt_h/2"/>
+                                          </p:val>
+                                        </p:tav>
+                                        <p:tav tm="100000">
+                                          <p:val>
+                                            <p:strVal val="#ppt_y"/>
+                                          </p:val>
+                                        </p:tav>
+                                      </p:tavLst>
+                                    </p:anim>
+                                  </p:childTnLst>
+                                </p:cTn>
+                              </p:par>
+                            </p:childTnLst>
+                          </p:cTn>
+                        </p:par>
+                      </p:childTnLst>
+                    </p:cTn>
+                  </p:par>
+                </p:childTnLst>
+              </p:cTn>
+              <p:prevCondLst>
+                <p:cond evt="onPrev" delay="0">
+                  <p:tgtEl>
+                    <p:sldTgt/>
+                  </p:tgtEl>
+                </p:cond>
+              </p:prevCondLst>
+              <p:nextCondLst>
+                <p:cond evt="onNext" delay="0">
+                  <p:tgtEl>
+                    <p:sldTgt/>
+                  </p:tgtEl>
+                </p:cond>
+              </p:nextCondLst>
+            </p:seq>
+          </p:childTnLst>
+        </p:cTn>
+      </p:par>
+    </p:tnLst>
+    <p:bldLst>
+      <p:bldP spid="3" grpId="0" build="p"/>
+    </p:bldLst>
   </p:timing>
 </p:sld>
 </file>

</xml_diff>